<commit_message>
new commit with -a
</commit_message>
<xml_diff>
--- a/GIT 4 VEK.pptx
+++ b/GIT 4 VEK.pptx
@@ -9409,15 +9409,11 @@
           <a:p>
             <a:r>
               <a:rPr lang="en-US" dirty="0" err="1"/>
-              <a:t>Clonando</a:t>
+              <a:t>Salvando</a:t>
             </a:r>
             <a:r>
               <a:rPr lang="en-US" dirty="0"/>
-              <a:t> um </a:t>
-            </a:r>
-            <a:r>
-              <a:rPr lang="en-US" dirty="0" err="1"/>
-              <a:t>repositório</a:t>
+              <a:t> um snapshot (commit)</a:t>
             </a:r>
             <a:endParaRPr lang="pt-BR" dirty="0"/>
           </a:p>
@@ -9444,7 +9440,87 @@
           <a:bodyPr/>
           <a:lstStyle/>
           <a:p>
-            <a:endParaRPr lang="pt-BR"/>
+            <a:r>
+              <a:rPr lang="pt-BR" dirty="0" err="1"/>
+              <a:t>git</a:t>
+            </a:r>
+            <a:r>
+              <a:rPr lang="pt-BR" dirty="0"/>
+              <a:t> </a:t>
+            </a:r>
+            <a:r>
+              <a:rPr lang="pt-BR" dirty="0" err="1"/>
+              <a:t>add</a:t>
+            </a:r>
+            <a:r>
+              <a:rPr lang="pt-BR" dirty="0"/>
+              <a:t> &lt;arquivo-1&gt; &lt;</a:t>
+            </a:r>
+            <a:r>
+              <a:rPr lang="pt-BR" dirty="0" err="1"/>
+              <a:t>arquivo-n</a:t>
+            </a:r>
+            <a:r>
+              <a:rPr lang="pt-BR" dirty="0"/>
+              <a:t>&gt; &lt;arquivos&gt;</a:t>
+            </a:r>
+          </a:p>
+          <a:p>
+            <a:r>
+              <a:rPr lang="pt-BR" dirty="0" err="1"/>
+              <a:t>git</a:t>
+            </a:r>
+            <a:r>
+              <a:rPr lang="pt-BR" dirty="0"/>
+              <a:t> </a:t>
+            </a:r>
+            <a:r>
+              <a:rPr lang="pt-BR" dirty="0" err="1"/>
+              <a:t>commit</a:t>
+            </a:r>
+            <a:endParaRPr lang="pt-BR" dirty="0"/>
+          </a:p>
+          <a:p>
+            <a:endParaRPr lang="pt-BR" dirty="0"/>
+          </a:p>
+          <a:p>
+            <a:r>
+              <a:rPr lang="pt-BR" dirty="0" err="1"/>
+              <a:t>git</a:t>
+            </a:r>
+            <a:r>
+              <a:rPr lang="pt-BR" dirty="0"/>
+              <a:t> </a:t>
+            </a:r>
+            <a:r>
+              <a:rPr lang="pt-BR" dirty="0" err="1"/>
+              <a:t>commit</a:t>
+            </a:r>
+            <a:r>
+              <a:rPr lang="pt-BR" dirty="0"/>
+              <a:t> -a</a:t>
+            </a:r>
+          </a:p>
+          <a:p>
+            <a:r>
+              <a:rPr lang="pt-BR" dirty="0" err="1"/>
+              <a:t>git</a:t>
+            </a:r>
+            <a:r>
+              <a:rPr lang="pt-BR" dirty="0"/>
+              <a:t> </a:t>
+            </a:r>
+            <a:r>
+              <a:rPr lang="pt-BR" dirty="0" err="1"/>
+              <a:t>commit</a:t>
+            </a:r>
+            <a:r>
+              <a:rPr lang="pt-BR" dirty="0"/>
+              <a:t> -m ‘Descrição’</a:t>
+            </a:r>
+          </a:p>
+          <a:p>
+            <a:endParaRPr lang="pt-BR" dirty="0"/>
           </a:p>
         </p:txBody>
       </p:sp>

</xml_diff>